<commit_message>
Matthew Evans slides for presentation, 'other cool stuff'
</commit_message>
<xml_diff>
--- a/Ocean - NFC Slide Show.pptx
+++ b/Ocean - NFC Slide Show.pptx
@@ -7,12 +7,13 @@
   <p:sldIdLst>
     <p:sldId id="256" r:id="rId2"/>
     <p:sldId id="257" r:id="rId3"/>
-    <p:sldId id="258" r:id="rId4"/>
-    <p:sldId id="259" r:id="rId5"/>
-    <p:sldId id="261" r:id="rId6"/>
-    <p:sldId id="263" r:id="rId7"/>
-    <p:sldId id="262" r:id="rId8"/>
-    <p:sldId id="260" r:id="rId9"/>
+    <p:sldId id="264" r:id="rId4"/>
+    <p:sldId id="270" r:id="rId5"/>
+    <p:sldId id="265" r:id="rId6"/>
+    <p:sldId id="266" r:id="rId7"/>
+    <p:sldId id="267" r:id="rId8"/>
+    <p:sldId id="268" r:id="rId9"/>
+    <p:sldId id="269" r:id="rId10"/>
   </p:sldIdLst>
   <p:sldSz cx="12192000" cy="6858000"/>
   <p:notesSz cx="6858000" cy="9144000"/>
@@ -4395,7 +4396,7 @@
           <a:p>
             <a:fld id="{D2706670-3FAE-4A2D-AC2F-75631C2905EF}" type="datetimeFigureOut">
               <a:rPr lang="en-ZA" smtClean="0"/>
-              <a:t>2019/03/15</a:t>
+              <a:t>2019/04/01</a:t>
             </a:fld>
             <a:endParaRPr lang="en-ZA"/>
           </a:p>
@@ -4662,7 +4663,7 @@
           <a:p>
             <a:fld id="{D2706670-3FAE-4A2D-AC2F-75631C2905EF}" type="datetimeFigureOut">
               <a:rPr lang="en-ZA" smtClean="0"/>
-              <a:t>2019/03/15</a:t>
+              <a:t>2019/04/01</a:t>
             </a:fld>
             <a:endParaRPr lang="en-ZA"/>
           </a:p>
@@ -4858,7 +4859,7 @@
           <a:p>
             <a:fld id="{D2706670-3FAE-4A2D-AC2F-75631C2905EF}" type="datetimeFigureOut">
               <a:rPr lang="en-ZA" smtClean="0"/>
-              <a:t>2019/03/15</a:t>
+              <a:t>2019/04/01</a:t>
             </a:fld>
             <a:endParaRPr lang="en-ZA"/>
           </a:p>
@@ -5121,7 +5122,7 @@
           <a:p>
             <a:fld id="{D2706670-3FAE-4A2D-AC2F-75631C2905EF}" type="datetimeFigureOut">
               <a:rPr lang="en-ZA" smtClean="0"/>
-              <a:t>2019/03/15</a:t>
+              <a:t>2019/04/01</a:t>
             </a:fld>
             <a:endParaRPr lang="en-ZA"/>
           </a:p>
@@ -5555,7 +5556,7 @@
           <a:p>
             <a:fld id="{D2706670-3FAE-4A2D-AC2F-75631C2905EF}" type="datetimeFigureOut">
               <a:rPr lang="en-ZA" smtClean="0"/>
-              <a:t>2019/03/15</a:t>
+              <a:t>2019/04/01</a:t>
             </a:fld>
             <a:endParaRPr lang="en-ZA"/>
           </a:p>
@@ -6101,7 +6102,7 @@
           <a:p>
             <a:fld id="{D2706670-3FAE-4A2D-AC2F-75631C2905EF}" type="datetimeFigureOut">
               <a:rPr lang="en-ZA" smtClean="0"/>
-              <a:t>2019/03/15</a:t>
+              <a:t>2019/04/01</a:t>
             </a:fld>
             <a:endParaRPr lang="en-ZA"/>
           </a:p>
@@ -6821,7 +6822,7 @@
           <a:p>
             <a:fld id="{D2706670-3FAE-4A2D-AC2F-75631C2905EF}" type="datetimeFigureOut">
               <a:rPr lang="en-ZA" smtClean="0"/>
-              <a:t>2019/03/15</a:t>
+              <a:t>2019/04/01</a:t>
             </a:fld>
             <a:endParaRPr lang="en-ZA"/>
           </a:p>
@@ -6991,7 +6992,7 @@
           <a:p>
             <a:fld id="{D2706670-3FAE-4A2D-AC2F-75631C2905EF}" type="datetimeFigureOut">
               <a:rPr lang="en-ZA" smtClean="0"/>
-              <a:t>2019/03/15</a:t>
+              <a:t>2019/04/01</a:t>
             </a:fld>
             <a:endParaRPr lang="en-ZA"/>
           </a:p>
@@ -7171,7 +7172,7 @@
           <a:p>
             <a:fld id="{D2706670-3FAE-4A2D-AC2F-75631C2905EF}" type="datetimeFigureOut">
               <a:rPr lang="en-ZA" smtClean="0"/>
-              <a:t>2019/03/15</a:t>
+              <a:t>2019/04/01</a:t>
             </a:fld>
             <a:endParaRPr lang="en-ZA"/>
           </a:p>
@@ -7341,7 +7342,7 @@
           <a:p>
             <a:fld id="{D2706670-3FAE-4A2D-AC2F-75631C2905EF}" type="datetimeFigureOut">
               <a:rPr lang="en-ZA" smtClean="0"/>
-              <a:t>2019/03/15</a:t>
+              <a:t>2019/04/01</a:t>
             </a:fld>
             <a:endParaRPr lang="en-ZA"/>
           </a:p>
@@ -7591,7 +7592,7 @@
           <a:p>
             <a:fld id="{D2706670-3FAE-4A2D-AC2F-75631C2905EF}" type="datetimeFigureOut">
               <a:rPr lang="en-ZA" smtClean="0"/>
-              <a:t>2019/03/15</a:t>
+              <a:t>2019/04/01</a:t>
             </a:fld>
             <a:endParaRPr lang="en-ZA"/>
           </a:p>
@@ -7823,7 +7824,7 @@
           <a:p>
             <a:fld id="{D2706670-3FAE-4A2D-AC2F-75631C2905EF}" type="datetimeFigureOut">
               <a:rPr lang="en-ZA" smtClean="0"/>
-              <a:t>2019/03/15</a:t>
+              <a:t>2019/04/01</a:t>
             </a:fld>
             <a:endParaRPr lang="en-ZA"/>
           </a:p>
@@ -8204,7 +8205,7 @@
           <a:p>
             <a:fld id="{D2706670-3FAE-4A2D-AC2F-75631C2905EF}" type="datetimeFigureOut">
               <a:rPr lang="en-ZA" smtClean="0"/>
-              <a:t>2019/03/15</a:t>
+              <a:t>2019/04/01</a:t>
             </a:fld>
             <a:endParaRPr lang="en-ZA"/>
           </a:p>
@@ -8322,7 +8323,7 @@
           <a:p>
             <a:fld id="{D2706670-3FAE-4A2D-AC2F-75631C2905EF}" type="datetimeFigureOut">
               <a:rPr lang="en-ZA" smtClean="0"/>
-              <a:t>2019/03/15</a:t>
+              <a:t>2019/04/01</a:t>
             </a:fld>
             <a:endParaRPr lang="en-ZA"/>
           </a:p>
@@ -8417,7 +8418,7 @@
           <a:p>
             <a:fld id="{D2706670-3FAE-4A2D-AC2F-75631C2905EF}" type="datetimeFigureOut">
               <a:rPr lang="en-ZA" smtClean="0"/>
-              <a:t>2019/03/15</a:t>
+              <a:t>2019/04/01</a:t>
             </a:fld>
             <a:endParaRPr lang="en-ZA"/>
           </a:p>
@@ -8666,7 +8667,7 @@
           <a:p>
             <a:fld id="{D2706670-3FAE-4A2D-AC2F-75631C2905EF}" type="datetimeFigureOut">
               <a:rPr lang="en-ZA" smtClean="0"/>
-              <a:t>2019/03/15</a:t>
+              <a:t>2019/04/01</a:t>
             </a:fld>
             <a:endParaRPr lang="en-ZA"/>
           </a:p>
@@ -8946,7 +8947,7 @@
           <a:p>
             <a:fld id="{D2706670-3FAE-4A2D-AC2F-75631C2905EF}" type="datetimeFigureOut">
               <a:rPr lang="en-ZA" smtClean="0"/>
-              <a:t>2019/03/15</a:t>
+              <a:t>2019/04/01</a:t>
             </a:fld>
             <a:endParaRPr lang="en-ZA"/>
           </a:p>
@@ -12023,7 +12024,7 @@
           <a:p>
             <a:fld id="{D2706670-3FAE-4A2D-AC2F-75631C2905EF}" type="datetimeFigureOut">
               <a:rPr lang="en-ZA" smtClean="0"/>
-              <a:t>2019/03/15</a:t>
+              <a:t>2019/04/01</a:t>
             </a:fld>
             <a:endParaRPr lang="en-ZA"/>
           </a:p>
@@ -12638,7 +12639,13 @@
       </p:grpSpPr>
       <p:sp>
         <p:nvSpPr>
-          <p:cNvPr id="2" name="Title 1"/>
+          <p:cNvPr id="2" name="Title 1">
+            <a:extLst>
+              <a:ext uri="{FF2B5EF4-FFF2-40B4-BE49-F238E27FC236}">
+                <a16:creationId xmlns:a16="http://schemas.microsoft.com/office/drawing/2014/main" id="{C0B07598-79DE-4A48-AD60-13B64BA6BB03}"/>
+              </a:ext>
+            </a:extLst>
+          </p:cNvPr>
           <p:cNvSpPr>
             <a:spLocks noGrp="1"/>
           </p:cNvSpPr>
@@ -12652,15 +12659,22 @@
           <a:lstStyle/>
           <a:p>
             <a:r>
-              <a:rPr lang="en-ZA" dirty="0"/>
-              <a:t>Project management (PM) tool</a:t>
-            </a:r>
+              <a:rPr lang="en-US" dirty="0"/>
+              <a:t>Matthew Evans</a:t>
+            </a:r>
+            <a:endParaRPr lang="en-ZA" dirty="0"/>
           </a:p>
         </p:txBody>
       </p:sp>
       <p:sp>
         <p:nvSpPr>
-          <p:cNvPr id="3" name="Content Placeholder 2"/>
+          <p:cNvPr id="3" name="Content Placeholder 2">
+            <a:extLst>
+              <a:ext uri="{FF2B5EF4-FFF2-40B4-BE49-F238E27FC236}">
+                <a16:creationId xmlns:a16="http://schemas.microsoft.com/office/drawing/2014/main" id="{7E3A87E8-0E2C-476A-BF40-B70FCC20F280}"/>
+              </a:ext>
+            </a:extLst>
+          </p:cNvPr>
           <p:cNvSpPr>
             <a:spLocks noGrp="1"/>
           </p:cNvSpPr>
@@ -12670,63 +12684,64 @@
         </p:nvSpPr>
         <p:spPr/>
         <p:txBody>
-          <a:bodyPr/>
+          <a:bodyPr>
+            <a:normAutofit fontScale="92500" lnSpcReduction="10000"/>
+          </a:bodyPr>
           <a:lstStyle/>
           <a:p>
-            <a:pPr marL="0" indent="0">
-              <a:buNone/>
-            </a:pPr>
-            <a:r>
-              <a:rPr lang="en-ZA" dirty="0"/>
-              <a:t>Made use of Trello:</a:t>
-            </a:r>
-          </a:p>
-          <a:p>
-            <a:pPr marL="0" indent="0">
-              <a:buNone/>
-            </a:pPr>
-            <a:r>
-              <a:rPr lang="en-ZA" dirty="0">
-                <a:hlinkClick r:id="rId2"/>
-              </a:rPr>
-              <a:t>https://trello.com/b/DyWaguQT/ocean-nfc</a:t>
-            </a:r>
-            <a:endParaRPr lang="en-ZA" dirty="0"/>
-          </a:p>
-          <a:p>
-            <a:pPr marL="0" indent="0">
-              <a:buNone/>
-            </a:pPr>
-            <a:r>
-              <a:rPr lang="en-ZA" dirty="0"/>
-              <a:t>Provided an intuitive way to see:</a:t>
-            </a:r>
-          </a:p>
-          <a:p>
-            <a:r>
-              <a:rPr lang="en-ZA" dirty="0"/>
-              <a:t>What work needs to be done</a:t>
-            </a:r>
-          </a:p>
-          <a:p>
-            <a:r>
-              <a:rPr lang="en-ZA" dirty="0"/>
-              <a:t>What work is being done</a:t>
-            </a:r>
-          </a:p>
-          <a:p>
-            <a:r>
-              <a:rPr lang="en-ZA" dirty="0"/>
-              <a:t>Assigning team members to tasks</a:t>
-            </a:r>
-          </a:p>
-          <a:p>
-            <a:endParaRPr lang="en-ZA" dirty="0"/>
-          </a:p>
-          <a:p>
-            <a:pPr marL="0" indent="0">
-              <a:buNone/>
-            </a:pPr>
+            <a:r>
+              <a:rPr lang="en-US" dirty="0"/>
+              <a:t>Team management</a:t>
+            </a:r>
+          </a:p>
+          <a:p>
+            <a:pPr lvl="1"/>
+            <a:r>
+              <a:rPr lang="en-US" dirty="0"/>
+              <a:t>Organizing meetings</a:t>
+            </a:r>
+          </a:p>
+          <a:p>
+            <a:pPr lvl="1"/>
+            <a:r>
+              <a:rPr lang="en-US" dirty="0"/>
+              <a:t>Delegating work</a:t>
+            </a:r>
+          </a:p>
+          <a:p>
+            <a:pPr lvl="1"/>
+            <a:r>
+              <a:rPr lang="en-US" dirty="0"/>
+              <a:t>Sorting out merge conflicts and git issues</a:t>
+            </a:r>
+          </a:p>
+          <a:p>
+            <a:r>
+              <a:rPr lang="en-US" dirty="0"/>
+              <a:t>System architecture</a:t>
+            </a:r>
+          </a:p>
+          <a:p>
+            <a:r>
+              <a:rPr lang="en-US" dirty="0"/>
+              <a:t>Continuous integration and hosting</a:t>
+            </a:r>
+          </a:p>
+          <a:p>
+            <a:pPr lvl="1"/>
+            <a:r>
+              <a:rPr lang="en-US" dirty="0"/>
+              <a:t>Travis CI</a:t>
+            </a:r>
+          </a:p>
+          <a:p>
+            <a:pPr lvl="1"/>
+            <a:r>
+              <a:rPr lang="en-US" dirty="0"/>
+              <a:t>Heroku</a:t>
+            </a:r>
+          </a:p>
+          <a:p>
             <a:endParaRPr lang="en-ZA" dirty="0"/>
           </a:p>
         </p:txBody>
@@ -12734,7 +12749,7 @@
     </p:spTree>
     <p:extLst>
       <p:ext uri="{BB962C8B-B14F-4D97-AF65-F5344CB8AC3E}">
-        <p14:creationId xmlns:p14="http://schemas.microsoft.com/office/powerpoint/2010/main" val="1066123014"/>
+        <p14:creationId xmlns:p14="http://schemas.microsoft.com/office/powerpoint/2010/main" val="2146885898"/>
       </p:ext>
     </p:extLst>
   </p:cSld>
@@ -12763,7 +12778,13 @@
       </p:grpSpPr>
       <p:sp>
         <p:nvSpPr>
-          <p:cNvPr id="2" name="Title 1"/>
+          <p:cNvPr id="2" name="Title 1">
+            <a:extLst>
+              <a:ext uri="{FF2B5EF4-FFF2-40B4-BE49-F238E27FC236}">
+                <a16:creationId xmlns:a16="http://schemas.microsoft.com/office/drawing/2014/main" id="{2E3F7191-83CE-4AD8-B3B3-119F2A470D0D}"/>
+              </a:ext>
+            </a:extLst>
+          </p:cNvPr>
           <p:cNvSpPr>
             <a:spLocks noGrp="1"/>
           </p:cNvSpPr>
@@ -12777,15 +12798,22 @@
           <a:lstStyle/>
           <a:p>
             <a:r>
-              <a:rPr lang="en-ZA" dirty="0"/>
-              <a:t>GIT Structure</a:t>
-            </a:r>
+              <a:rPr lang="en-US" dirty="0"/>
+              <a:t>Matthew Evans</a:t>
+            </a:r>
+            <a:endParaRPr lang="en-ZA" dirty="0"/>
           </a:p>
         </p:txBody>
       </p:sp>
       <p:sp>
         <p:nvSpPr>
-          <p:cNvPr id="3" name="Content Placeholder 2"/>
+          <p:cNvPr id="3" name="Content Placeholder 2">
+            <a:extLst>
+              <a:ext uri="{FF2B5EF4-FFF2-40B4-BE49-F238E27FC236}">
+                <a16:creationId xmlns:a16="http://schemas.microsoft.com/office/drawing/2014/main" id="{72A46385-D154-42AA-8B63-3131A006835D}"/>
+              </a:ext>
+            </a:extLst>
+          </p:cNvPr>
           <p:cNvSpPr>
             <a:spLocks noGrp="1"/>
           </p:cNvSpPr>
@@ -12795,55 +12823,83 @@
         </p:nvSpPr>
         <p:spPr/>
         <p:txBody>
-          <a:bodyPr>
-            <a:normAutofit/>
-          </a:bodyPr>
+          <a:bodyPr/>
           <a:lstStyle/>
           <a:p>
-            <a:pPr marL="0" indent="0">
-              <a:buNone/>
-            </a:pPr>
+            <a:r>
+              <a:rPr lang="en-US" dirty="0"/>
+              <a:t>Database + ORM setup</a:t>
+            </a:r>
+          </a:p>
+          <a:p>
+            <a:pPr lvl="1"/>
+            <a:r>
+              <a:rPr lang="en-US" dirty="0" err="1"/>
+              <a:t>TypeORM</a:t>
+            </a:r>
+            <a:r>
+              <a:rPr lang="en-US" dirty="0"/>
+              <a:t> with Heroku Postgres/SQLite for local </a:t>
+            </a:r>
+            <a:r>
+              <a:rPr lang="en-US" dirty="0" err="1"/>
+              <a:t>develoment</a:t>
+            </a:r>
+            <a:endParaRPr lang="en-US" dirty="0"/>
+          </a:p>
+          <a:p>
             <a:r>
               <a:rPr lang="en-ZA" dirty="0"/>
-              <a:t>Utilised Git Flow:</a:t>
-            </a:r>
-          </a:p>
-          <a:p>
+              <a:t>Custom build environment setup</a:t>
+            </a:r>
+          </a:p>
+          <a:p>
+            <a:pPr lvl="1"/>
+            <a:r>
+              <a:rPr lang="en-ZA" dirty="0" err="1"/>
+              <a:t>Transpiling</a:t>
+            </a:r>
             <a:r>
               <a:rPr lang="en-ZA" dirty="0"/>
-              <a:t>Checkout development</a:t>
-            </a:r>
-          </a:p>
-          <a:p>
+              <a:t> Typescript</a:t>
+            </a:r>
+          </a:p>
+          <a:p>
+            <a:pPr lvl="1"/>
             <a:r>
               <a:rPr lang="en-ZA" dirty="0"/>
-              <a:t>Branch from development into our own branch</a:t>
-            </a:r>
-          </a:p>
-          <a:p>
+              <a:t>Environment setup</a:t>
+            </a:r>
+          </a:p>
+          <a:p>
+            <a:pPr lvl="1"/>
             <a:r>
               <a:rPr lang="en-ZA" dirty="0"/>
-              <a:t>Merge from own branch back into development</a:t>
-            </a:r>
-          </a:p>
-          <a:p>
+              <a:t>Testing setup (.</a:t>
+            </a:r>
+            <a:r>
+              <a:rPr lang="en-ZA" dirty="0" err="1"/>
+              <a:t>spec.ts</a:t>
+            </a:r>
             <a:r>
               <a:rPr lang="en-ZA" dirty="0"/>
-              <a:t>When development is up to standard…</a:t>
-            </a:r>
-          </a:p>
-          <a:p>
-            <a:r>
-              <a:rPr lang="en-ZA" dirty="0"/>
-              <a:t>Merge development with master</a:t>
-            </a:r>
+              <a:t>)</a:t>
+            </a:r>
+          </a:p>
+          <a:p>
+            <a:pPr lvl="1"/>
+            <a:endParaRPr lang="en-ZA" dirty="0"/>
+          </a:p>
+          <a:p>
+            <a:pPr lvl="1"/>
+            <a:endParaRPr lang="en-ZA" dirty="0"/>
           </a:p>
         </p:txBody>
       </p:sp>
     </p:spTree>
     <p:extLst>
       <p:ext uri="{BB962C8B-B14F-4D97-AF65-F5344CB8AC3E}">
-        <p14:creationId xmlns:p14="http://schemas.microsoft.com/office/powerpoint/2010/main" val="347774909"/>
+        <p14:creationId xmlns:p14="http://schemas.microsoft.com/office/powerpoint/2010/main" val="857446538"/>
       </p:ext>
     </p:extLst>
   </p:cSld>
@@ -12875,7 +12931,7 @@
           <p:cNvPr id="2" name="Title 1">
             <a:extLst>
               <a:ext uri="{FF2B5EF4-FFF2-40B4-BE49-F238E27FC236}">
-                <a16:creationId xmlns:a16="http://schemas.microsoft.com/office/drawing/2014/main" id="{18EB0C6A-6EAF-43B0-A65E-2A24E8EF52A3}"/>
+                <a16:creationId xmlns:a16="http://schemas.microsoft.com/office/drawing/2014/main" id="{D1B24DC7-2FB4-45FA-834E-4D94A58B7D38}"/>
               </a:ext>
             </a:extLst>
           </p:cNvPr>
@@ -12893,7 +12949,11 @@
           <a:p>
             <a:r>
               <a:rPr lang="en-US" dirty="0"/>
-              <a:t>Git Structure</a:t>
+              <a:t>Jarrod </a:t>
+            </a:r>
+            <a:r>
+              <a:rPr lang="en-US" dirty="0" err="1"/>
+              <a:t>Goschen</a:t>
             </a:r>
             <a:endParaRPr lang="en-ZA" dirty="0"/>
           </a:p>
@@ -12904,7 +12964,7 @@
           <p:cNvPr id="3" name="Content Placeholder 2">
             <a:extLst>
               <a:ext uri="{FF2B5EF4-FFF2-40B4-BE49-F238E27FC236}">
-                <a16:creationId xmlns:a16="http://schemas.microsoft.com/office/drawing/2014/main" id="{81507DF1-F101-41CA-9AA9-6E7333919574}"/>
+                <a16:creationId xmlns:a16="http://schemas.microsoft.com/office/drawing/2014/main" id="{EC67CB4B-6E57-43C4-80E6-A1C598ACF1DC}"/>
               </a:ext>
             </a:extLst>
           </p:cNvPr>
@@ -12920,44 +12980,14 @@
           <a:bodyPr/>
           <a:lstStyle/>
           <a:p>
-            <a:r>
-              <a:rPr lang="en-ZA" dirty="0"/>
-              <a:t>This pattern works well for us, because when we merge into master, it automatically deploys our server on Heroku</a:t>
-            </a:r>
-          </a:p>
-          <a:p>
-            <a:r>
-              <a:rPr lang="en-ZA" dirty="0"/>
-              <a:t>We used feature branching rather than person branching:</a:t>
-            </a:r>
-          </a:p>
-          <a:p>
-            <a:pPr lvl="1"/>
-            <a:r>
-              <a:rPr lang="en-ZA" dirty="0"/>
-              <a:t>Focus on tasks over people</a:t>
-            </a:r>
-          </a:p>
-          <a:p>
-            <a:pPr lvl="1"/>
-            <a:r>
-              <a:rPr lang="en-ZA" dirty="0"/>
-              <a:t>Collaborative development (you’re not intruding on other people’s work)</a:t>
-            </a:r>
-          </a:p>
-          <a:p>
-            <a:pPr lvl="1"/>
-            <a:r>
-              <a:rPr lang="en-ZA" dirty="0"/>
-              <a:t>If anything goes wrong, can easily go back to the feature branch where it was working</a:t>
-            </a:r>
+            <a:endParaRPr lang="en-ZA"/>
           </a:p>
         </p:txBody>
       </p:sp>
     </p:spTree>
     <p:extLst>
       <p:ext uri="{BB962C8B-B14F-4D97-AF65-F5344CB8AC3E}">
-        <p14:creationId xmlns:p14="http://schemas.microsoft.com/office/powerpoint/2010/main" val="2667958434"/>
+        <p14:creationId xmlns:p14="http://schemas.microsoft.com/office/powerpoint/2010/main" val="1283290924"/>
       </p:ext>
     </p:extLst>
   </p:cSld>
@@ -12989,7 +13019,7 @@
           <p:cNvPr id="2" name="Title 1">
             <a:extLst>
               <a:ext uri="{FF2B5EF4-FFF2-40B4-BE49-F238E27FC236}">
-                <a16:creationId xmlns:a16="http://schemas.microsoft.com/office/drawing/2014/main" id="{CC1617E5-A274-4CF7-A354-A44332598D84}"/>
+                <a16:creationId xmlns:a16="http://schemas.microsoft.com/office/drawing/2014/main" id="{FB5FFF3B-B357-48A5-81DD-B5A2DDB5920E}"/>
               </a:ext>
             </a:extLst>
           </p:cNvPr>
@@ -13007,7 +13037,7 @@
           <a:p>
             <a:r>
               <a:rPr lang="en-US" dirty="0"/>
-              <a:t>Technologies Used</a:t>
+              <a:t>Johan Nel</a:t>
             </a:r>
             <a:endParaRPr lang="en-ZA" dirty="0"/>
           </a:p>
@@ -13018,7 +13048,7 @@
           <p:cNvPr id="3" name="Content Placeholder 2">
             <a:extLst>
               <a:ext uri="{FF2B5EF4-FFF2-40B4-BE49-F238E27FC236}">
-                <a16:creationId xmlns:a16="http://schemas.microsoft.com/office/drawing/2014/main" id="{A41EB01A-DA95-4C0D-910E-9CC70FB487EA}"/>
+                <a16:creationId xmlns:a16="http://schemas.microsoft.com/office/drawing/2014/main" id="{C43F5128-4E91-42B9-BEE0-BDD71D3E2CC6}"/>
               </a:ext>
             </a:extLst>
           </p:cNvPr>
@@ -13031,66 +13061,17 @@
         </p:nvSpPr>
         <p:spPr/>
         <p:txBody>
-          <a:bodyPr>
-            <a:normAutofit fontScale="92500" lnSpcReduction="10000"/>
-          </a:bodyPr>
+          <a:bodyPr/>
           <a:lstStyle/>
           <a:p>
-            <a:r>
-              <a:rPr lang="en-US" dirty="0"/>
-              <a:t>GitHub</a:t>
-            </a:r>
-          </a:p>
-          <a:p>
-            <a:r>
-              <a:rPr lang="en-US" dirty="0"/>
-              <a:t>Nodejs (plus </a:t>
-            </a:r>
-            <a:r>
-              <a:rPr lang="en-US" dirty="0" err="1"/>
-              <a:t>npm</a:t>
-            </a:r>
-            <a:r>
-              <a:rPr lang="en-US" dirty="0"/>
-              <a:t> for package management)</a:t>
-            </a:r>
-          </a:p>
-          <a:p>
-            <a:r>
-              <a:rPr lang="en-US" dirty="0"/>
-              <a:t>Express.js</a:t>
-            </a:r>
-          </a:p>
-          <a:p>
-            <a:r>
-              <a:rPr lang="en-US" dirty="0"/>
-              <a:t>Typescript</a:t>
-            </a:r>
-          </a:p>
-          <a:p>
-            <a:r>
-              <a:rPr lang="en-US" dirty="0"/>
-              <a:t>SQLite</a:t>
-            </a:r>
-          </a:p>
-          <a:p>
-            <a:r>
-              <a:rPr lang="en-US" dirty="0"/>
-              <a:t>Heroku</a:t>
-            </a:r>
-          </a:p>
-          <a:p>
-            <a:r>
-              <a:rPr lang="en-US" dirty="0"/>
-              <a:t>Mocha and Chai</a:t>
-            </a:r>
+            <a:endParaRPr lang="en-ZA"/>
           </a:p>
         </p:txBody>
       </p:sp>
     </p:spTree>
     <p:extLst>
       <p:ext uri="{BB962C8B-B14F-4D97-AF65-F5344CB8AC3E}">
-        <p14:creationId xmlns:p14="http://schemas.microsoft.com/office/powerpoint/2010/main" val="3673168692"/>
+        <p14:creationId xmlns:p14="http://schemas.microsoft.com/office/powerpoint/2010/main" val="217040745"/>
       </p:ext>
     </p:extLst>
   </p:cSld>
@@ -13122,7 +13103,7 @@
           <p:cNvPr id="2" name="Title 1">
             <a:extLst>
               <a:ext uri="{FF2B5EF4-FFF2-40B4-BE49-F238E27FC236}">
-                <a16:creationId xmlns:a16="http://schemas.microsoft.com/office/drawing/2014/main" id="{4443A229-B7E5-424E-A0BA-36704D9559CF}"/>
+                <a16:creationId xmlns:a16="http://schemas.microsoft.com/office/drawing/2014/main" id="{878222C0-2DF4-496A-A835-45A3B6761DC7}"/>
               </a:ext>
             </a:extLst>
           </p:cNvPr>
@@ -13140,7 +13121,11 @@
           <a:p>
             <a:r>
               <a:rPr lang="en-US" dirty="0"/>
-              <a:t>Mock Functionality</a:t>
+              <a:t>Given </a:t>
+            </a:r>
+            <a:r>
+              <a:rPr lang="en-US" dirty="0" err="1"/>
+              <a:t>Rakgoale</a:t>
             </a:r>
             <a:endParaRPr lang="en-ZA" dirty="0"/>
           </a:p>
@@ -13151,7 +13136,7 @@
           <p:cNvPr id="3" name="Content Placeholder 2">
             <a:extLst>
               <a:ext uri="{FF2B5EF4-FFF2-40B4-BE49-F238E27FC236}">
-                <a16:creationId xmlns:a16="http://schemas.microsoft.com/office/drawing/2014/main" id="{6ADCEE9B-0E7E-428F-956C-B918BDA8B99C}"/>
+                <a16:creationId xmlns:a16="http://schemas.microsoft.com/office/drawing/2014/main" id="{E86DDB3D-40BC-4107-9399-CEBB34D1DB55}"/>
               </a:ext>
             </a:extLst>
           </p:cNvPr>
@@ -13167,61 +13152,14 @@
           <a:bodyPr/>
           <a:lstStyle/>
           <a:p>
-            <a:r>
-              <a:rPr lang="en-US" dirty="0"/>
-              <a:t>Used SQLite database</a:t>
-            </a:r>
-          </a:p>
-          <a:p>
-            <a:pPr lvl="1"/>
-            <a:r>
-              <a:rPr lang="en-US" dirty="0"/>
-              <a:t>Simple, fast implementation</a:t>
-            </a:r>
-          </a:p>
-          <a:p>
-            <a:pPr lvl="1"/>
-            <a:r>
-              <a:rPr lang="en-US" dirty="0"/>
-              <a:t>Don’t have to worry about authentication</a:t>
-            </a:r>
-          </a:p>
-          <a:p>
-            <a:pPr lvl="1"/>
-            <a:r>
-              <a:rPr lang="en-US" dirty="0"/>
-              <a:t>Not distributed</a:t>
-            </a:r>
-          </a:p>
-          <a:p>
-            <a:pPr lvl="1"/>
-            <a:r>
-              <a:rPr lang="en-US" dirty="0"/>
-              <a:t>No redundancy</a:t>
-            </a:r>
-          </a:p>
-          <a:p>
-            <a:pPr lvl="1"/>
-            <a:r>
-              <a:rPr lang="en-US" dirty="0"/>
-              <a:t>No backups</a:t>
-            </a:r>
             <a:endParaRPr lang="en-ZA" dirty="0"/>
-          </a:p>
-          <a:p>
-            <a:pPr lvl="1"/>
-            <a:r>
-              <a:rPr lang="en-ZA" dirty="0"/>
-              <a:t>Plan to move to a DDBMS in production</a:t>
-            </a:r>
-            <a:endParaRPr lang="en-US" dirty="0"/>
           </a:p>
         </p:txBody>
       </p:sp>
     </p:spTree>
     <p:extLst>
       <p:ext uri="{BB962C8B-B14F-4D97-AF65-F5344CB8AC3E}">
-        <p14:creationId xmlns:p14="http://schemas.microsoft.com/office/powerpoint/2010/main" val="2835187550"/>
+        <p14:creationId xmlns:p14="http://schemas.microsoft.com/office/powerpoint/2010/main" val="3989051781"/>
       </p:ext>
     </p:extLst>
   </p:cSld>
@@ -13250,7 +13188,13 @@
       </p:grpSpPr>
       <p:sp>
         <p:nvSpPr>
-          <p:cNvPr id="2" name="Title 1"/>
+          <p:cNvPr id="2" name="Title 1">
+            <a:extLst>
+              <a:ext uri="{FF2B5EF4-FFF2-40B4-BE49-F238E27FC236}">
+                <a16:creationId xmlns:a16="http://schemas.microsoft.com/office/drawing/2014/main" id="{DB002D76-779E-42AC-8103-5CA78FCA9529}"/>
+              </a:ext>
+            </a:extLst>
+          </p:cNvPr>
           <p:cNvSpPr>
             <a:spLocks noGrp="1"/>
           </p:cNvSpPr>
@@ -13264,15 +13208,22 @@
           <a:lstStyle/>
           <a:p>
             <a:r>
-              <a:rPr lang="en-ZA" dirty="0"/>
-              <a:t>Unit testing</a:t>
-            </a:r>
+              <a:rPr lang="en-US" dirty="0"/>
+              <a:t>Dewald van Hoven</a:t>
+            </a:r>
+            <a:endParaRPr lang="en-ZA" dirty="0"/>
           </a:p>
         </p:txBody>
       </p:sp>
       <p:sp>
         <p:nvSpPr>
-          <p:cNvPr id="3" name="Content Placeholder 2"/>
+          <p:cNvPr id="3" name="Content Placeholder 2">
+            <a:extLst>
+              <a:ext uri="{FF2B5EF4-FFF2-40B4-BE49-F238E27FC236}">
+                <a16:creationId xmlns:a16="http://schemas.microsoft.com/office/drawing/2014/main" id="{56D0F6FB-16D0-4F8C-9C3D-88D897B1F4B6}"/>
+              </a:ext>
+            </a:extLst>
+          </p:cNvPr>
           <p:cNvSpPr>
             <a:spLocks noGrp="1"/>
           </p:cNvSpPr>
@@ -13285,44 +13236,152 @@
           <a:bodyPr/>
           <a:lstStyle/>
           <a:p>
-            <a:pPr marL="0" indent="0">
-              <a:buNone/>
-            </a:pPr>
-            <a:r>
-              <a:rPr lang="en-ZA" dirty="0"/>
-              <a:t>Made use of:</a:t>
-            </a:r>
-          </a:p>
-          <a:p>
-            <a:r>
-              <a:rPr lang="en-ZA" dirty="0"/>
-              <a:t>Mocha</a:t>
-            </a:r>
-          </a:p>
-          <a:p>
-            <a:r>
-              <a:rPr lang="en-ZA" dirty="0"/>
-              <a:t>Chai</a:t>
-            </a:r>
-          </a:p>
-          <a:p>
             <a:endParaRPr lang="en-ZA" dirty="0"/>
-          </a:p>
-          <a:p>
-            <a:pPr marL="0" indent="0">
-              <a:buNone/>
-            </a:pPr>
-            <a:r>
-              <a:rPr lang="en-ZA" dirty="0"/>
-              <a:t>Tests API endpoints to ensure edge cases are working as desired.</a:t>
-            </a:r>
           </a:p>
         </p:txBody>
       </p:sp>
     </p:spTree>
     <p:extLst>
       <p:ext uri="{BB962C8B-B14F-4D97-AF65-F5344CB8AC3E}">
-        <p14:creationId xmlns:p14="http://schemas.microsoft.com/office/powerpoint/2010/main" val="3799279281"/>
+        <p14:creationId xmlns:p14="http://schemas.microsoft.com/office/powerpoint/2010/main" val="2087194097"/>
+      </p:ext>
+    </p:extLst>
+  </p:cSld>
+  <p:clrMapOvr>
+    <a:masterClrMapping/>
+  </p:clrMapOvr>
+</p:sld>
+</file>
+
+<file path=ppt/slides/slide9.xml><?xml version="1.0" encoding="utf-8"?>
+<p:sld xmlns:a="http://schemas.openxmlformats.org/drawingml/2006/main" xmlns:r="http://schemas.openxmlformats.org/officeDocument/2006/relationships" xmlns:p="http://schemas.openxmlformats.org/presentationml/2006/main">
+  <p:cSld>
+    <p:spTree>
+      <p:nvGrpSpPr>
+        <p:cNvPr id="1" name=""/>
+        <p:cNvGrpSpPr/>
+        <p:nvPr/>
+      </p:nvGrpSpPr>
+      <p:grpSpPr>
+        <a:xfrm>
+          <a:off x="0" y="0"/>
+          <a:ext cx="0" cy="0"/>
+          <a:chOff x="0" y="0"/>
+          <a:chExt cx="0" cy="0"/>
+        </a:xfrm>
+      </p:grpSpPr>
+      <p:sp>
+        <p:nvSpPr>
+          <p:cNvPr id="2" name="Title 1">
+            <a:extLst>
+              <a:ext uri="{FF2B5EF4-FFF2-40B4-BE49-F238E27FC236}">
+                <a16:creationId xmlns:a16="http://schemas.microsoft.com/office/drawing/2014/main" id="{DB0A529F-5A33-48B3-86C6-EBB25FF53F1E}"/>
+              </a:ext>
+            </a:extLst>
+          </p:cNvPr>
+          <p:cNvSpPr>
+            <a:spLocks noGrp="1"/>
+          </p:cNvSpPr>
+          <p:nvPr>
+            <p:ph type="title"/>
+          </p:nvPr>
+        </p:nvSpPr>
+        <p:spPr/>
+        <p:txBody>
+          <a:bodyPr/>
+          <a:lstStyle/>
+          <a:p>
+            <a:r>
+              <a:rPr lang="en-US" dirty="0"/>
+              <a:t>“Any other fancy stuff”</a:t>
+            </a:r>
+            <a:endParaRPr lang="en-ZA" dirty="0"/>
+          </a:p>
+        </p:txBody>
+      </p:sp>
+      <p:sp>
+        <p:nvSpPr>
+          <p:cNvPr id="3" name="Content Placeholder 2">
+            <a:extLst>
+              <a:ext uri="{FF2B5EF4-FFF2-40B4-BE49-F238E27FC236}">
+                <a16:creationId xmlns:a16="http://schemas.microsoft.com/office/drawing/2014/main" id="{80BB8A29-DD73-4E53-8FC5-F0CF16209C2D}"/>
+              </a:ext>
+            </a:extLst>
+          </p:cNvPr>
+          <p:cNvSpPr>
+            <a:spLocks noGrp="1"/>
+          </p:cNvSpPr>
+          <p:nvPr>
+            <p:ph idx="1"/>
+          </p:nvPr>
+        </p:nvSpPr>
+        <p:spPr/>
+        <p:txBody>
+          <a:bodyPr/>
+          <a:lstStyle/>
+          <a:p>
+            <a:r>
+              <a:rPr lang="en-US" dirty="0"/>
+              <a:t>Heroku</a:t>
+            </a:r>
+          </a:p>
+          <a:p>
+            <a:pPr lvl="1"/>
+            <a:r>
+              <a:rPr lang="en-US" dirty="0"/>
+              <a:t>Continuous deployment</a:t>
+            </a:r>
+          </a:p>
+          <a:p>
+            <a:pPr lvl="1"/>
+            <a:r>
+              <a:rPr lang="en-US" dirty="0"/>
+              <a:t>Staging server</a:t>
+            </a:r>
+          </a:p>
+          <a:p>
+            <a:r>
+              <a:rPr lang="en-US" dirty="0"/>
+              <a:t>Custom build environment</a:t>
+            </a:r>
+          </a:p>
+          <a:p>
+            <a:pPr lvl="1"/>
+            <a:r>
+              <a:rPr lang="en-US" dirty="0"/>
+              <a:t>.env file for local development database</a:t>
+            </a:r>
+            <a:endParaRPr lang="en-ZA" dirty="0"/>
+          </a:p>
+          <a:p>
+            <a:r>
+              <a:rPr lang="en-ZA" dirty="0"/>
+              <a:t>Travis CI integration for unit testing on PR</a:t>
+            </a:r>
+          </a:p>
+          <a:p>
+            <a:r>
+              <a:rPr lang="en-ZA" dirty="0"/>
+              <a:t>Slack </a:t>
+            </a:r>
+            <a:r>
+              <a:rPr lang="en-ZA" dirty="0" err="1"/>
+              <a:t>Github</a:t>
+            </a:r>
+            <a:r>
+              <a:rPr lang="en-ZA" dirty="0"/>
+              <a:t> integration for updates</a:t>
+            </a:r>
+          </a:p>
+          <a:p>
+            <a:endParaRPr lang="en-US" dirty="0"/>
+          </a:p>
+        </p:txBody>
+      </p:sp>
+    </p:spTree>
+    <p:extLst>
+      <p:ext uri="{BB962C8B-B14F-4D97-AF65-F5344CB8AC3E}">
+        <p14:creationId xmlns:p14="http://schemas.microsoft.com/office/powerpoint/2010/main" val="3129451473"/>
       </p:ext>
     </p:extLst>
   </p:cSld>

</xml_diff>